<commit_message>
New Sankey and code
</commit_message>
<xml_diff>
--- a/round2_metareview/analyze_data/sankey_figs/Sankey_August19_Labels_Legend.pptx
+++ b/round2_metareview/analyze_data/sankey_figs/Sankey_August19_Labels_Legend.pptx
@@ -259,7 +259,7 @@
           <a:p>
             <a:fld id="{F2AC3253-1CFD-4A24-957F-2F7321146FAC}" type="datetimeFigureOut">
               <a:rPr lang="en-US" smtClean="0"/>
-              <a:t>8/19/2020</a:t>
+              <a:t>10/18/2021</a:t>
             </a:fld>
             <a:endParaRPr lang="en-US"/>
           </a:p>
@@ -457,7 +457,7 @@
           <a:p>
             <a:fld id="{F2AC3253-1CFD-4A24-957F-2F7321146FAC}" type="datetimeFigureOut">
               <a:rPr lang="en-US" smtClean="0"/>
-              <a:t>8/19/2020</a:t>
+              <a:t>10/18/2021</a:t>
             </a:fld>
             <a:endParaRPr lang="en-US"/>
           </a:p>
@@ -665,7 +665,7 @@
           <a:p>
             <a:fld id="{F2AC3253-1CFD-4A24-957F-2F7321146FAC}" type="datetimeFigureOut">
               <a:rPr lang="en-US" smtClean="0"/>
-              <a:t>8/19/2020</a:t>
+              <a:t>10/18/2021</a:t>
             </a:fld>
             <a:endParaRPr lang="en-US"/>
           </a:p>
@@ -863,7 +863,7 @@
           <a:p>
             <a:fld id="{F2AC3253-1CFD-4A24-957F-2F7321146FAC}" type="datetimeFigureOut">
               <a:rPr lang="en-US" smtClean="0"/>
-              <a:t>8/19/2020</a:t>
+              <a:t>10/18/2021</a:t>
             </a:fld>
             <a:endParaRPr lang="en-US"/>
           </a:p>
@@ -1138,7 +1138,7 @@
           <a:p>
             <a:fld id="{F2AC3253-1CFD-4A24-957F-2F7321146FAC}" type="datetimeFigureOut">
               <a:rPr lang="en-US" smtClean="0"/>
-              <a:t>8/19/2020</a:t>
+              <a:t>10/18/2021</a:t>
             </a:fld>
             <a:endParaRPr lang="en-US"/>
           </a:p>
@@ -1403,7 +1403,7 @@
           <a:p>
             <a:fld id="{F2AC3253-1CFD-4A24-957F-2F7321146FAC}" type="datetimeFigureOut">
               <a:rPr lang="en-US" smtClean="0"/>
-              <a:t>8/19/2020</a:t>
+              <a:t>10/18/2021</a:t>
             </a:fld>
             <a:endParaRPr lang="en-US"/>
           </a:p>
@@ -1815,7 +1815,7 @@
           <a:p>
             <a:fld id="{F2AC3253-1CFD-4A24-957F-2F7321146FAC}" type="datetimeFigureOut">
               <a:rPr lang="en-US" smtClean="0"/>
-              <a:t>8/19/2020</a:t>
+              <a:t>10/18/2021</a:t>
             </a:fld>
             <a:endParaRPr lang="en-US"/>
           </a:p>
@@ -1956,7 +1956,7 @@
           <a:p>
             <a:fld id="{F2AC3253-1CFD-4A24-957F-2F7321146FAC}" type="datetimeFigureOut">
               <a:rPr lang="en-US" smtClean="0"/>
-              <a:t>8/19/2020</a:t>
+              <a:t>10/18/2021</a:t>
             </a:fld>
             <a:endParaRPr lang="en-US"/>
           </a:p>
@@ -2069,7 +2069,7 @@
           <a:p>
             <a:fld id="{F2AC3253-1CFD-4A24-957F-2F7321146FAC}" type="datetimeFigureOut">
               <a:rPr lang="en-US" smtClean="0"/>
-              <a:t>8/19/2020</a:t>
+              <a:t>10/18/2021</a:t>
             </a:fld>
             <a:endParaRPr lang="en-US"/>
           </a:p>
@@ -2380,7 +2380,7 @@
           <a:p>
             <a:fld id="{F2AC3253-1CFD-4A24-957F-2F7321146FAC}" type="datetimeFigureOut">
               <a:rPr lang="en-US" smtClean="0"/>
-              <a:t>8/19/2020</a:t>
+              <a:t>10/18/2021</a:t>
             </a:fld>
             <a:endParaRPr lang="en-US"/>
           </a:p>
@@ -2668,7 +2668,7 @@
           <a:p>
             <a:fld id="{F2AC3253-1CFD-4A24-957F-2F7321146FAC}" type="datetimeFigureOut">
               <a:rPr lang="en-US" smtClean="0"/>
-              <a:t>8/19/2020</a:t>
+              <a:t>10/18/2021</a:t>
             </a:fld>
             <a:endParaRPr lang="en-US"/>
           </a:p>
@@ -2909,7 +2909,7 @@
           <a:p>
             <a:fld id="{F2AC3253-1CFD-4A24-957F-2F7321146FAC}" type="datetimeFigureOut">
               <a:rPr lang="en-US" smtClean="0"/>
-              <a:t>8/19/2020</a:t>
+              <a:t>10/18/2021</a:t>
             </a:fld>
             <a:endParaRPr lang="en-US"/>
           </a:p>
@@ -3326,708 +3326,785 @@
           <a:chExt cx="0" cy="0"/>
         </a:xfrm>
       </p:grpSpPr>
-      <p:pic>
-        <p:nvPicPr>
-          <p:cNvPr id="5" name="Picture 4" descr="A close up of a piece of paper&#10;&#10;Description automatically generated">
-            <a:extLst>
-              <a:ext uri="{FF2B5EF4-FFF2-40B4-BE49-F238E27FC236}">
-                <a16:creationId xmlns:a16="http://schemas.microsoft.com/office/drawing/2014/main" id="{711EE934-A51A-4EBA-9F5A-5CA8C1B59B60}"/>
-              </a:ext>
-            </a:extLst>
-          </p:cNvPr>
-          <p:cNvPicPr>
-            <a:picLocks noChangeAspect="1"/>
-          </p:cNvPicPr>
+      <p:grpSp>
+        <p:nvGrpSpPr>
+          <p:cNvPr id="4" name="Group 3">
+            <a:extLst>
+              <a:ext uri="{FF2B5EF4-FFF2-40B4-BE49-F238E27FC236}">
+                <a16:creationId xmlns:a16="http://schemas.microsoft.com/office/drawing/2014/main" id="{058FD4B5-F77F-4AAE-AA35-5FEEF26229DB}"/>
+              </a:ext>
+            </a:extLst>
+          </p:cNvPr>
+          <p:cNvGrpSpPr/>
           <p:nvPr/>
-        </p:nvPicPr>
-        <p:blipFill rotWithShape="1">
-          <a:blip r:embed="rId2">
-            <a:extLst>
-              <a:ext uri="{28A0092B-C50C-407E-A947-70E740481C1C}">
-                <a14:useLocalDpi xmlns:a14="http://schemas.microsoft.com/office/drawing/2010/main" val="0"/>
-              </a:ext>
-            </a:extLst>
-          </a:blip>
-          <a:srcRect l="4819" t="2816" r="4366"/>
-          <a:stretch/>
-        </p:blipFill>
-        <p:spPr>
+        </p:nvGrpSpPr>
+        <p:grpSpPr>
           <a:xfrm>
-            <a:off x="2866765" y="472932"/>
-            <a:ext cx="8657438" cy="5223038"/>
+            <a:off x="620784" y="113211"/>
+            <a:ext cx="11571216" cy="6559257"/>
+            <a:chOff x="620784" y="113211"/>
+            <a:chExt cx="11571216" cy="6559257"/>
           </a:xfrm>
-          <a:prstGeom prst="rect">
-            <a:avLst/>
-          </a:prstGeom>
-        </p:spPr>
-      </p:pic>
-      <p:sp>
-        <p:nvSpPr>
-          <p:cNvPr id="6" name="TextBox 5">
-            <a:extLst>
-              <a:ext uri="{FF2B5EF4-FFF2-40B4-BE49-F238E27FC236}">
-                <a16:creationId xmlns:a16="http://schemas.microsoft.com/office/drawing/2014/main" id="{D1AB695F-E582-4B98-AC28-DABBD345C38E}"/>
-              </a:ext>
-            </a:extLst>
-          </p:cNvPr>
-          <p:cNvSpPr txBox="1"/>
-          <p:nvPr/>
-        </p:nvSpPr>
-        <p:spPr>
-          <a:xfrm>
-            <a:off x="2254369" y="1333251"/>
-            <a:ext cx="822121" cy="323165"/>
-          </a:xfrm>
-          <a:prstGeom prst="rect">
-            <a:avLst/>
-          </a:prstGeom>
-          <a:noFill/>
-        </p:spPr>
-        <p:txBody>
-          <a:bodyPr wrap="square" rtlCol="0">
-            <a:spAutoFit/>
-          </a:bodyPr>
-          <a:lstStyle/>
-          <a:p>
-            <a:r>
-              <a:rPr lang="en-US" sz="1450" dirty="0">
+        </p:grpSpPr>
+        <p:pic>
+          <p:nvPicPr>
+            <p:cNvPr id="3" name="Picture 2" descr="Chart, diagram&#10;&#10;Description automatically generated">
+              <a:extLst>
+                <a:ext uri="{FF2B5EF4-FFF2-40B4-BE49-F238E27FC236}">
+                  <a16:creationId xmlns:a16="http://schemas.microsoft.com/office/drawing/2014/main" id="{75BA0A37-A387-4F28-B5CF-5B99EE67D4D5}"/>
+                </a:ext>
+              </a:extLst>
+            </p:cNvPr>
+            <p:cNvPicPr>
+              <a:picLocks noChangeAspect="1"/>
+            </p:cNvPicPr>
+            <p:nvPr/>
+          </p:nvPicPr>
+          <p:blipFill rotWithShape="1">
+            <a:blip r:embed="rId2">
+              <a:extLst>
+                <a:ext uri="{28A0092B-C50C-407E-A947-70E740481C1C}">
+                  <a14:useLocalDpi xmlns:a14="http://schemas.microsoft.com/office/drawing/2010/main" val="0"/>
+                </a:ext>
+              </a:extLst>
+            </a:blip>
+            <a:srcRect t="3694"/>
+            <a:stretch/>
+          </p:blipFill>
+          <p:spPr>
+            <a:xfrm>
+              <a:off x="2064876" y="851135"/>
+              <a:ext cx="10127124" cy="5499681"/>
+            </a:xfrm>
+            <a:prstGeom prst="rect">
+              <a:avLst/>
+            </a:prstGeom>
+          </p:spPr>
+        </p:pic>
+        <p:sp>
+          <p:nvSpPr>
+            <p:cNvPr id="6" name="TextBox 5">
+              <a:extLst>
+                <a:ext uri="{FF2B5EF4-FFF2-40B4-BE49-F238E27FC236}">
+                  <a16:creationId xmlns:a16="http://schemas.microsoft.com/office/drawing/2014/main" id="{D1AB695F-E582-4B98-AC28-DABBD345C38E}"/>
+                </a:ext>
+              </a:extLst>
+            </p:cNvPr>
+            <p:cNvSpPr txBox="1"/>
+            <p:nvPr/>
+          </p:nvSpPr>
+          <p:spPr>
+            <a:xfrm>
+              <a:off x="1806673" y="1383100"/>
+              <a:ext cx="1022686" cy="338554"/>
+            </a:xfrm>
+            <a:prstGeom prst="rect">
+              <a:avLst/>
+            </a:prstGeom>
+            <a:noFill/>
+          </p:spPr>
+          <p:txBody>
+            <a:bodyPr wrap="square" rtlCol="0">
+              <a:spAutoFit/>
+            </a:bodyPr>
+            <a:lstStyle/>
+            <a:p>
+              <a:pPr algn="r"/>
+              <a:r>
+                <a:rPr lang="en-US" sz="1600" dirty="0">
+                  <a:latin typeface="Arial" panose="020B0604020202020204" pitchFamily="34" charset="0"/>
+                  <a:cs typeface="Arial" panose="020B0604020202020204" pitchFamily="34" charset="0"/>
+                </a:rPr>
+                <a:t>Human</a:t>
+              </a:r>
+            </a:p>
+          </p:txBody>
+        </p:sp>
+        <p:sp>
+          <p:nvSpPr>
+            <p:cNvPr id="7" name="TextBox 6">
+              <a:extLst>
+                <a:ext uri="{FF2B5EF4-FFF2-40B4-BE49-F238E27FC236}">
+                  <a16:creationId xmlns:a16="http://schemas.microsoft.com/office/drawing/2014/main" id="{29C8C254-9386-486F-B810-B3A527E74C74}"/>
+                </a:ext>
+              </a:extLst>
+            </p:cNvPr>
+            <p:cNvSpPr txBox="1"/>
+            <p:nvPr/>
+          </p:nvSpPr>
+          <p:spPr>
+            <a:xfrm>
+              <a:off x="1913802" y="3873010"/>
+              <a:ext cx="915557" cy="338554"/>
+            </a:xfrm>
+            <a:prstGeom prst="rect">
+              <a:avLst/>
+            </a:prstGeom>
+            <a:noFill/>
+          </p:spPr>
+          <p:txBody>
+            <a:bodyPr wrap="square" rtlCol="0">
+              <a:spAutoFit/>
+            </a:bodyPr>
+            <a:lstStyle/>
+            <a:p>
+              <a:pPr algn="r"/>
+              <a:r>
+                <a:rPr lang="en-US" sz="1600" dirty="0">
+                  <a:latin typeface="Arial" panose="020B0604020202020204" pitchFamily="34" charset="0"/>
+                  <a:cs typeface="Arial" panose="020B0604020202020204" pitchFamily="34" charset="0"/>
+                </a:rPr>
+                <a:t>Biotic</a:t>
+              </a:r>
+              <a:endParaRPr lang="en-US" sz="1450" dirty="0">
                 <a:latin typeface="Arial" panose="020B0604020202020204" pitchFamily="34" charset="0"/>
                 <a:cs typeface="Arial" panose="020B0604020202020204" pitchFamily="34" charset="0"/>
-              </a:rPr>
-              <a:t>Human</a:t>
-            </a:r>
-          </a:p>
-        </p:txBody>
-      </p:sp>
-      <p:sp>
-        <p:nvSpPr>
-          <p:cNvPr id="7" name="TextBox 6">
-            <a:extLst>
-              <a:ext uri="{FF2B5EF4-FFF2-40B4-BE49-F238E27FC236}">
-                <a16:creationId xmlns:a16="http://schemas.microsoft.com/office/drawing/2014/main" id="{29C8C254-9386-486F-B810-B3A527E74C74}"/>
-              </a:ext>
-            </a:extLst>
-          </p:cNvPr>
-          <p:cNvSpPr txBox="1"/>
-          <p:nvPr/>
-        </p:nvSpPr>
-        <p:spPr>
-          <a:xfrm>
-            <a:off x="2399779" y="2645223"/>
-            <a:ext cx="676711" cy="323165"/>
-          </a:xfrm>
-          <a:prstGeom prst="rect">
-            <a:avLst/>
-          </a:prstGeom>
-          <a:noFill/>
-        </p:spPr>
-        <p:txBody>
-          <a:bodyPr wrap="square" rtlCol="0">
-            <a:spAutoFit/>
-          </a:bodyPr>
-          <a:lstStyle/>
-          <a:p>
-            <a:r>
-              <a:rPr lang="en-US" sz="1450" dirty="0">
-                <a:latin typeface="Arial" panose="020B0604020202020204" pitchFamily="34" charset="0"/>
-                <a:cs typeface="Arial" panose="020B0604020202020204" pitchFamily="34" charset="0"/>
-              </a:rPr>
-              <a:t>Biotic</a:t>
-            </a:r>
-          </a:p>
-        </p:txBody>
-      </p:sp>
-      <p:sp>
-        <p:nvSpPr>
-          <p:cNvPr id="8" name="TextBox 7">
-            <a:extLst>
-              <a:ext uri="{FF2B5EF4-FFF2-40B4-BE49-F238E27FC236}">
-                <a16:creationId xmlns:a16="http://schemas.microsoft.com/office/drawing/2014/main" id="{8D407F6D-77FB-42BB-82B9-8936C88DBB35}"/>
-              </a:ext>
-            </a:extLst>
-          </p:cNvPr>
-          <p:cNvSpPr txBox="1"/>
-          <p:nvPr/>
-        </p:nvSpPr>
-        <p:spPr>
-          <a:xfrm>
-            <a:off x="1673880" y="3538598"/>
-            <a:ext cx="1367406" cy="315471"/>
-          </a:xfrm>
-          <a:prstGeom prst="rect">
-            <a:avLst/>
-          </a:prstGeom>
-          <a:noFill/>
-        </p:spPr>
-        <p:txBody>
-          <a:bodyPr wrap="square" rtlCol="0">
-            <a:spAutoFit/>
-          </a:bodyPr>
-          <a:lstStyle/>
-          <a:p>
-            <a:r>
-              <a:rPr lang="en-US" sz="1450" dirty="0">
-                <a:latin typeface="Arial" panose="020B0604020202020204" pitchFamily="34" charset="0"/>
-                <a:cs typeface="Arial" panose="020B0604020202020204" pitchFamily="34" charset="0"/>
-              </a:rPr>
-              <a:t>Environmental</a:t>
-            </a:r>
-          </a:p>
-        </p:txBody>
-      </p:sp>
-      <p:sp>
-        <p:nvSpPr>
-          <p:cNvPr id="11" name="TextBox 10">
-            <a:extLst>
-              <a:ext uri="{FF2B5EF4-FFF2-40B4-BE49-F238E27FC236}">
-                <a16:creationId xmlns:a16="http://schemas.microsoft.com/office/drawing/2014/main" id="{EB641B69-CAF6-4116-8E41-F65D675A88E8}"/>
-              </a:ext>
-            </a:extLst>
-          </p:cNvPr>
-          <p:cNvSpPr txBox="1"/>
-          <p:nvPr/>
-        </p:nvSpPr>
-        <p:spPr>
-          <a:xfrm>
-            <a:off x="2466650" y="234425"/>
-            <a:ext cx="1524242" cy="369332"/>
-          </a:xfrm>
-          <a:prstGeom prst="rect">
-            <a:avLst/>
-          </a:prstGeom>
-          <a:noFill/>
-        </p:spPr>
-        <p:txBody>
-          <a:bodyPr wrap="square" rtlCol="0">
-            <a:spAutoFit/>
-          </a:bodyPr>
-          <a:lstStyle/>
-          <a:p>
-            <a:pPr algn="ctr"/>
-            <a:r>
-              <a:rPr lang="en-US" b="1" dirty="0">
-                <a:latin typeface="Arial" panose="020B0604020202020204" pitchFamily="34" charset="0"/>
-                <a:cs typeface="Arial" panose="020B0604020202020204" pitchFamily="34" charset="0"/>
-              </a:rPr>
-              <a:t>Driver Type</a:t>
-            </a:r>
-          </a:p>
-        </p:txBody>
-      </p:sp>
-      <p:sp>
-        <p:nvSpPr>
-          <p:cNvPr id="12" name="TextBox 11">
-            <a:extLst>
-              <a:ext uri="{FF2B5EF4-FFF2-40B4-BE49-F238E27FC236}">
-                <a16:creationId xmlns:a16="http://schemas.microsoft.com/office/drawing/2014/main" id="{5DED08C5-A5CE-436B-9051-336BFE4152D9}"/>
-              </a:ext>
-            </a:extLst>
-          </p:cNvPr>
-          <p:cNvSpPr txBox="1"/>
-          <p:nvPr/>
-        </p:nvSpPr>
-        <p:spPr>
-          <a:xfrm>
-            <a:off x="7386096" y="240002"/>
-            <a:ext cx="2337684" cy="369332"/>
-          </a:xfrm>
-          <a:prstGeom prst="rect">
-            <a:avLst/>
-          </a:prstGeom>
-          <a:noFill/>
-        </p:spPr>
-        <p:txBody>
-          <a:bodyPr wrap="square" rtlCol="0">
-            <a:spAutoFit/>
-          </a:bodyPr>
-          <a:lstStyle/>
-          <a:p>
-            <a:pPr algn="ctr"/>
-            <a:r>
-              <a:rPr lang="en-US" b="1" dirty="0">
-                <a:latin typeface="Arial" panose="020B0604020202020204" pitchFamily="34" charset="0"/>
-                <a:cs typeface="Arial" panose="020B0604020202020204" pitchFamily="34" charset="0"/>
-              </a:rPr>
-              <a:t>Ecosystem Service</a:t>
-            </a:r>
-          </a:p>
-        </p:txBody>
-      </p:sp>
-      <p:sp>
-        <p:nvSpPr>
-          <p:cNvPr id="13" name="Rectangle 12">
-            <a:extLst>
-              <a:ext uri="{FF2B5EF4-FFF2-40B4-BE49-F238E27FC236}">
-                <a16:creationId xmlns:a16="http://schemas.microsoft.com/office/drawing/2014/main" id="{50FAD710-FA36-4FA5-B5EC-0C86286C503E}"/>
-              </a:ext>
-            </a:extLst>
-          </p:cNvPr>
-          <p:cNvSpPr/>
-          <p:nvPr/>
-        </p:nvSpPr>
-        <p:spPr>
-          <a:xfrm>
-            <a:off x="1014189" y="5042263"/>
-            <a:ext cx="426720" cy="252548"/>
-          </a:xfrm>
-          <a:prstGeom prst="rect">
-            <a:avLst/>
-          </a:prstGeom>
-          <a:solidFill>
-            <a:srgbClr val="191919"/>
-          </a:solidFill>
-        </p:spPr>
-        <p:style>
-          <a:lnRef idx="2">
-            <a:schemeClr val="accent1">
-              <a:shade val="50000"/>
-            </a:schemeClr>
-          </a:lnRef>
-          <a:fillRef idx="1">
-            <a:schemeClr val="accent1"/>
-          </a:fillRef>
-          <a:effectRef idx="0">
-            <a:schemeClr val="accent1"/>
-          </a:effectRef>
-          <a:fontRef idx="minor">
-            <a:schemeClr val="lt1"/>
-          </a:fontRef>
-        </p:style>
-        <p:txBody>
-          <a:bodyPr rtlCol="0" anchor="ctr"/>
-          <a:lstStyle/>
-          <a:p>
-            <a:pPr algn="ctr"/>
-            <a:endParaRPr lang="en-US"/>
-          </a:p>
-        </p:txBody>
-      </p:sp>
-      <p:sp>
-        <p:nvSpPr>
-          <p:cNvPr id="14" name="Rectangle 13">
-            <a:extLst>
-              <a:ext uri="{FF2B5EF4-FFF2-40B4-BE49-F238E27FC236}">
-                <a16:creationId xmlns:a16="http://schemas.microsoft.com/office/drawing/2014/main" id="{DD028B59-F141-42F7-B662-6FDDEE25572C}"/>
-              </a:ext>
-            </a:extLst>
-          </p:cNvPr>
-          <p:cNvSpPr/>
-          <p:nvPr/>
-        </p:nvSpPr>
-        <p:spPr>
-          <a:xfrm>
-            <a:off x="1014189" y="5434149"/>
-            <a:ext cx="426720" cy="252548"/>
-          </a:xfrm>
-          <a:prstGeom prst="rect">
-            <a:avLst/>
-          </a:prstGeom>
-          <a:solidFill>
-            <a:srgbClr val="8C8C8C"/>
-          </a:solidFill>
-        </p:spPr>
-        <p:style>
-          <a:lnRef idx="2">
-            <a:schemeClr val="accent1">
-              <a:shade val="50000"/>
-            </a:schemeClr>
-          </a:lnRef>
-          <a:fillRef idx="1">
-            <a:schemeClr val="accent1"/>
-          </a:fillRef>
-          <a:effectRef idx="0">
-            <a:schemeClr val="accent1"/>
-          </a:effectRef>
-          <a:fontRef idx="minor">
-            <a:schemeClr val="lt1"/>
-          </a:fontRef>
-        </p:style>
-        <p:txBody>
-          <a:bodyPr rtlCol="0" anchor="ctr"/>
-          <a:lstStyle/>
-          <a:p>
-            <a:pPr algn="ctr"/>
-            <a:endParaRPr lang="en-US"/>
-          </a:p>
-        </p:txBody>
-      </p:sp>
-      <p:sp>
-        <p:nvSpPr>
-          <p:cNvPr id="15" name="Rectangle 14">
-            <a:extLst>
-              <a:ext uri="{FF2B5EF4-FFF2-40B4-BE49-F238E27FC236}">
-                <a16:creationId xmlns:a16="http://schemas.microsoft.com/office/drawing/2014/main" id="{36FCFCDD-0F02-4375-8B56-3AFDB2793DB6}"/>
-              </a:ext>
-            </a:extLst>
-          </p:cNvPr>
-          <p:cNvSpPr/>
-          <p:nvPr/>
-        </p:nvSpPr>
-        <p:spPr>
-          <a:xfrm>
-            <a:off x="1014189" y="5826035"/>
-            <a:ext cx="426720" cy="252548"/>
-          </a:xfrm>
-          <a:prstGeom prst="rect">
-            <a:avLst/>
-          </a:prstGeom>
-          <a:solidFill>
-            <a:srgbClr val="D7D7D7"/>
-          </a:solidFill>
-        </p:spPr>
-        <p:style>
-          <a:lnRef idx="2">
-            <a:schemeClr val="accent1">
-              <a:shade val="50000"/>
-            </a:schemeClr>
-          </a:lnRef>
-          <a:fillRef idx="1">
-            <a:schemeClr val="accent1"/>
-          </a:fillRef>
-          <a:effectRef idx="0">
-            <a:schemeClr val="accent1"/>
-          </a:effectRef>
-          <a:fontRef idx="minor">
-            <a:schemeClr val="lt1"/>
-          </a:fontRef>
-        </p:style>
-        <p:txBody>
-          <a:bodyPr rtlCol="0" anchor="ctr"/>
-          <a:lstStyle/>
-          <a:p>
-            <a:pPr algn="ctr"/>
-            <a:endParaRPr lang="en-US"/>
-          </a:p>
-        </p:txBody>
-      </p:sp>
-      <p:sp>
-        <p:nvSpPr>
-          <p:cNvPr id="16" name="Rectangle 15">
-            <a:extLst>
-              <a:ext uri="{FF2B5EF4-FFF2-40B4-BE49-F238E27FC236}">
-                <a16:creationId xmlns:a16="http://schemas.microsoft.com/office/drawing/2014/main" id="{377FAAD1-2B14-4AC7-AEF8-98786F323159}"/>
-              </a:ext>
-            </a:extLst>
-          </p:cNvPr>
-          <p:cNvSpPr/>
-          <p:nvPr/>
-        </p:nvSpPr>
-        <p:spPr>
-          <a:xfrm>
-            <a:off x="1014189" y="6200504"/>
-            <a:ext cx="426720" cy="252548"/>
-          </a:xfrm>
-          <a:prstGeom prst="rect">
-            <a:avLst/>
-          </a:prstGeom>
-          <a:solidFill>
-            <a:srgbClr val="FFFFFF"/>
-          </a:solidFill>
-        </p:spPr>
-        <p:style>
-          <a:lnRef idx="2">
-            <a:schemeClr val="accent1">
-              <a:shade val="50000"/>
-            </a:schemeClr>
-          </a:lnRef>
-          <a:fillRef idx="1">
-            <a:schemeClr val="accent1"/>
-          </a:fillRef>
-          <a:effectRef idx="0">
-            <a:schemeClr val="accent1"/>
-          </a:effectRef>
-          <a:fontRef idx="minor">
-            <a:schemeClr val="lt1"/>
-          </a:fontRef>
-        </p:style>
-        <p:txBody>
-          <a:bodyPr rtlCol="0" anchor="ctr"/>
-          <a:lstStyle/>
-          <a:p>
-            <a:pPr algn="ctr"/>
-            <a:endParaRPr lang="en-US"/>
-          </a:p>
-        </p:txBody>
-      </p:sp>
-      <p:sp>
-        <p:nvSpPr>
-          <p:cNvPr id="17" name="TextBox 16">
-            <a:extLst>
-              <a:ext uri="{FF2B5EF4-FFF2-40B4-BE49-F238E27FC236}">
-                <a16:creationId xmlns:a16="http://schemas.microsoft.com/office/drawing/2014/main" id="{729C819A-8DB2-46F1-A08F-D7FCCCDF1A30}"/>
-              </a:ext>
-            </a:extLst>
-          </p:cNvPr>
-          <p:cNvSpPr txBox="1"/>
-          <p:nvPr/>
-        </p:nvSpPr>
-        <p:spPr>
-          <a:xfrm>
-            <a:off x="1554289" y="5014648"/>
-            <a:ext cx="1741714" cy="307777"/>
-          </a:xfrm>
-          <a:prstGeom prst="rect">
-            <a:avLst/>
-          </a:prstGeom>
-          <a:noFill/>
-        </p:spPr>
-        <p:txBody>
-          <a:bodyPr wrap="square" rtlCol="0">
-            <a:spAutoFit/>
-          </a:bodyPr>
-          <a:lstStyle/>
-          <a:p>
-            <a:r>
-              <a:rPr lang="en-US" sz="1400" dirty="0"/>
-              <a:t>Regulating Services</a:t>
-            </a:r>
-          </a:p>
-        </p:txBody>
-      </p:sp>
-      <p:sp>
-        <p:nvSpPr>
-          <p:cNvPr id="18" name="TextBox 17">
-            <a:extLst>
-              <a:ext uri="{FF2B5EF4-FFF2-40B4-BE49-F238E27FC236}">
-                <a16:creationId xmlns:a16="http://schemas.microsoft.com/office/drawing/2014/main" id="{A94B020D-0233-42B1-9B65-32032FAB2382}"/>
-              </a:ext>
-            </a:extLst>
-          </p:cNvPr>
-          <p:cNvSpPr txBox="1"/>
-          <p:nvPr/>
-        </p:nvSpPr>
-        <p:spPr>
-          <a:xfrm>
-            <a:off x="1554289" y="5406534"/>
-            <a:ext cx="1741714" cy="307777"/>
-          </a:xfrm>
-          <a:prstGeom prst="rect">
-            <a:avLst/>
-          </a:prstGeom>
-          <a:noFill/>
-        </p:spPr>
-        <p:txBody>
-          <a:bodyPr wrap="square" rtlCol="0">
-            <a:spAutoFit/>
-          </a:bodyPr>
-          <a:lstStyle/>
-          <a:p>
-            <a:r>
-              <a:rPr lang="en-US" sz="1400" dirty="0"/>
-              <a:t>Supporting Services</a:t>
-            </a:r>
-          </a:p>
-        </p:txBody>
-      </p:sp>
-      <p:sp>
-        <p:nvSpPr>
-          <p:cNvPr id="19" name="TextBox 18">
-            <a:extLst>
-              <a:ext uri="{FF2B5EF4-FFF2-40B4-BE49-F238E27FC236}">
-                <a16:creationId xmlns:a16="http://schemas.microsoft.com/office/drawing/2014/main" id="{EF2FD066-C346-4C05-A49C-6506C0533CD4}"/>
-              </a:ext>
-            </a:extLst>
-          </p:cNvPr>
-          <p:cNvSpPr txBox="1"/>
-          <p:nvPr/>
-        </p:nvSpPr>
-        <p:spPr>
-          <a:xfrm>
-            <a:off x="1554289" y="5826037"/>
-            <a:ext cx="1741714" cy="307777"/>
-          </a:xfrm>
-          <a:prstGeom prst="rect">
-            <a:avLst/>
-          </a:prstGeom>
-          <a:noFill/>
-        </p:spPr>
-        <p:txBody>
-          <a:bodyPr wrap="square" rtlCol="0">
-            <a:spAutoFit/>
-          </a:bodyPr>
-          <a:lstStyle/>
-          <a:p>
-            <a:r>
-              <a:rPr lang="en-US" sz="1400" dirty="0"/>
-              <a:t>Provisioning Services</a:t>
-            </a:r>
-          </a:p>
-        </p:txBody>
-      </p:sp>
-      <p:sp>
-        <p:nvSpPr>
-          <p:cNvPr id="20" name="TextBox 19">
-            <a:extLst>
-              <a:ext uri="{FF2B5EF4-FFF2-40B4-BE49-F238E27FC236}">
-                <a16:creationId xmlns:a16="http://schemas.microsoft.com/office/drawing/2014/main" id="{A407AE30-4588-44C2-B293-6DF14F8396DA}"/>
-              </a:ext>
-            </a:extLst>
-          </p:cNvPr>
-          <p:cNvSpPr txBox="1"/>
-          <p:nvPr/>
-        </p:nvSpPr>
-        <p:spPr>
-          <a:xfrm>
-            <a:off x="1554289" y="6172889"/>
-            <a:ext cx="1741714" cy="307777"/>
-          </a:xfrm>
-          <a:prstGeom prst="rect">
-            <a:avLst/>
-          </a:prstGeom>
-          <a:noFill/>
-        </p:spPr>
-        <p:txBody>
-          <a:bodyPr wrap="square" rtlCol="0">
-            <a:spAutoFit/>
-          </a:bodyPr>
-          <a:lstStyle/>
-          <a:p>
-            <a:r>
-              <a:rPr lang="en-US" sz="1400" dirty="0"/>
-              <a:t>Cultural Services</a:t>
-            </a:r>
-          </a:p>
-        </p:txBody>
-      </p:sp>
-      <p:sp>
-        <p:nvSpPr>
-          <p:cNvPr id="21" name="TextBox 20">
-            <a:extLst>
-              <a:ext uri="{FF2B5EF4-FFF2-40B4-BE49-F238E27FC236}">
-                <a16:creationId xmlns:a16="http://schemas.microsoft.com/office/drawing/2014/main" id="{203CA84C-637D-473E-AB0B-1D9E0879F48D}"/>
-              </a:ext>
-            </a:extLst>
-          </p:cNvPr>
-          <p:cNvSpPr txBox="1"/>
-          <p:nvPr/>
-        </p:nvSpPr>
-        <p:spPr>
-          <a:xfrm>
-            <a:off x="985473" y="4560528"/>
-            <a:ext cx="2189046" cy="369332"/>
-          </a:xfrm>
-          <a:prstGeom prst="rect">
-            <a:avLst/>
-          </a:prstGeom>
-          <a:noFill/>
-        </p:spPr>
-        <p:txBody>
-          <a:bodyPr wrap="square" rtlCol="0">
-            <a:spAutoFit/>
-          </a:bodyPr>
-          <a:lstStyle/>
-          <a:p>
-            <a:r>
-              <a:rPr lang="en-US" b="1" dirty="0"/>
-              <a:t>Legend</a:t>
-            </a:r>
-          </a:p>
-        </p:txBody>
-      </p:sp>
-      <p:sp>
-        <p:nvSpPr>
-          <p:cNvPr id="22" name="Rectangle 21">
-            <a:extLst>
-              <a:ext uri="{FF2B5EF4-FFF2-40B4-BE49-F238E27FC236}">
-                <a16:creationId xmlns:a16="http://schemas.microsoft.com/office/drawing/2014/main" id="{F6D9FB7F-4C14-40CE-ADE5-0632774F7B87}"/>
-              </a:ext>
-            </a:extLst>
-          </p:cNvPr>
-          <p:cNvSpPr/>
-          <p:nvPr/>
-        </p:nvSpPr>
-        <p:spPr>
-          <a:xfrm>
-            <a:off x="620784" y="4445816"/>
-            <a:ext cx="2777839" cy="2225988"/>
-          </a:xfrm>
-          <a:prstGeom prst="rect">
-            <a:avLst/>
-          </a:prstGeom>
-          <a:noFill/>
-          <a:ln w="38100">
+              </a:endParaRPr>
+            </a:p>
+          </p:txBody>
+        </p:sp>
+        <p:sp>
+          <p:nvSpPr>
+            <p:cNvPr id="8" name="TextBox 7">
+              <a:extLst>
+                <a:ext uri="{FF2B5EF4-FFF2-40B4-BE49-F238E27FC236}">
+                  <a16:creationId xmlns:a16="http://schemas.microsoft.com/office/drawing/2014/main" id="{8D407F6D-77FB-42BB-82B9-8936C88DBB35}"/>
+                </a:ext>
+              </a:extLst>
+            </p:cNvPr>
+            <p:cNvSpPr txBox="1"/>
+            <p:nvPr/>
+          </p:nvSpPr>
+          <p:spPr>
+            <a:xfrm>
+              <a:off x="1262514" y="3126347"/>
+              <a:ext cx="1566845" cy="338554"/>
+            </a:xfrm>
+            <a:prstGeom prst="rect">
+              <a:avLst/>
+            </a:prstGeom>
+            <a:noFill/>
+          </p:spPr>
+          <p:txBody>
+            <a:bodyPr wrap="square" rtlCol="0">
+              <a:spAutoFit/>
+            </a:bodyPr>
+            <a:lstStyle/>
+            <a:p>
+              <a:pPr algn="r"/>
+              <a:r>
+                <a:rPr lang="en-US" sz="1600" dirty="0">
+                  <a:latin typeface="Arial" panose="020B0604020202020204" pitchFamily="34" charset="0"/>
+                  <a:cs typeface="Arial" panose="020B0604020202020204" pitchFamily="34" charset="0"/>
+                </a:rPr>
+                <a:t>Environmental</a:t>
+              </a:r>
+            </a:p>
+          </p:txBody>
+        </p:sp>
+        <p:sp>
+          <p:nvSpPr>
+            <p:cNvPr id="11" name="TextBox 10">
+              <a:extLst>
+                <a:ext uri="{FF2B5EF4-FFF2-40B4-BE49-F238E27FC236}">
+                  <a16:creationId xmlns:a16="http://schemas.microsoft.com/office/drawing/2014/main" id="{EB641B69-CAF6-4116-8E41-F65D675A88E8}"/>
+                </a:ext>
+              </a:extLst>
+            </p:cNvPr>
+            <p:cNvSpPr txBox="1"/>
+            <p:nvPr/>
+          </p:nvSpPr>
+          <p:spPr>
+            <a:xfrm>
+              <a:off x="2399779" y="684333"/>
+              <a:ext cx="1524242" cy="369332"/>
+            </a:xfrm>
+            <a:prstGeom prst="rect">
+              <a:avLst/>
+            </a:prstGeom>
+            <a:noFill/>
+          </p:spPr>
+          <p:txBody>
+            <a:bodyPr wrap="square" rtlCol="0">
+              <a:spAutoFit/>
+            </a:bodyPr>
+            <a:lstStyle/>
+            <a:p>
+              <a:pPr algn="ctr"/>
+              <a:r>
+                <a:rPr lang="en-US" b="1" dirty="0">
+                  <a:latin typeface="Arial" panose="020B0604020202020204" pitchFamily="34" charset="0"/>
+                  <a:cs typeface="Arial" panose="020B0604020202020204" pitchFamily="34" charset="0"/>
+                </a:rPr>
+                <a:t>Driver Type</a:t>
+              </a:r>
+            </a:p>
+          </p:txBody>
+        </p:sp>
+        <p:sp>
+          <p:nvSpPr>
+            <p:cNvPr id="12" name="TextBox 11">
+              <a:extLst>
+                <a:ext uri="{FF2B5EF4-FFF2-40B4-BE49-F238E27FC236}">
+                  <a16:creationId xmlns:a16="http://schemas.microsoft.com/office/drawing/2014/main" id="{5DED08C5-A5CE-436B-9051-336BFE4152D9}"/>
+                </a:ext>
+              </a:extLst>
+            </p:cNvPr>
+            <p:cNvSpPr txBox="1"/>
+            <p:nvPr/>
+          </p:nvSpPr>
+          <p:spPr>
+            <a:xfrm>
+              <a:off x="8122943" y="499667"/>
+              <a:ext cx="2337684" cy="369332"/>
+            </a:xfrm>
+            <a:prstGeom prst="rect">
+              <a:avLst/>
+            </a:prstGeom>
+            <a:noFill/>
+          </p:spPr>
+          <p:txBody>
+            <a:bodyPr wrap="square" rtlCol="0">
+              <a:spAutoFit/>
+            </a:bodyPr>
+            <a:lstStyle/>
+            <a:p>
+              <a:pPr algn="ctr"/>
+              <a:r>
+                <a:rPr lang="en-US" b="1" dirty="0">
+                  <a:latin typeface="Arial" panose="020B0604020202020204" pitchFamily="34" charset="0"/>
+                  <a:cs typeface="Arial" panose="020B0604020202020204" pitchFamily="34" charset="0"/>
+                </a:rPr>
+                <a:t>Ecosystem Service</a:t>
+              </a:r>
+            </a:p>
+          </p:txBody>
+        </p:sp>
+        <p:sp>
+          <p:nvSpPr>
+            <p:cNvPr id="13" name="Rectangle 12">
+              <a:extLst>
+                <a:ext uri="{FF2B5EF4-FFF2-40B4-BE49-F238E27FC236}">
+                  <a16:creationId xmlns:a16="http://schemas.microsoft.com/office/drawing/2014/main" id="{50FAD710-FA36-4FA5-B5EC-0C86286C503E}"/>
+                </a:ext>
+              </a:extLst>
+            </p:cNvPr>
+            <p:cNvSpPr/>
+            <p:nvPr/>
+          </p:nvSpPr>
+          <p:spPr>
+            <a:xfrm>
+              <a:off x="1014189" y="5042263"/>
+              <a:ext cx="426720" cy="252548"/>
+            </a:xfrm>
+            <a:prstGeom prst="rect">
+              <a:avLst/>
+            </a:prstGeom>
             <a:solidFill>
-              <a:schemeClr val="tx1"/>
+              <a:srgbClr val="191919"/>
             </a:solidFill>
-          </a:ln>
-        </p:spPr>
-        <p:style>
-          <a:lnRef idx="2">
-            <a:schemeClr val="accent1">
-              <a:shade val="50000"/>
-            </a:schemeClr>
-          </a:lnRef>
-          <a:fillRef idx="1">
-            <a:schemeClr val="accent1"/>
-          </a:fillRef>
-          <a:effectRef idx="0">
-            <a:schemeClr val="accent1"/>
-          </a:effectRef>
-          <a:fontRef idx="minor">
-            <a:schemeClr val="lt1"/>
-          </a:fontRef>
-        </p:style>
-        <p:txBody>
-          <a:bodyPr rtlCol="0" anchor="ctr"/>
-          <a:lstStyle/>
-          <a:p>
-            <a:pPr algn="ctr"/>
-            <a:endParaRPr lang="en-US"/>
-          </a:p>
-        </p:txBody>
-      </p:sp>
-      <p:sp>
-        <p:nvSpPr>
-          <p:cNvPr id="23" name="Rectangle 22">
-            <a:extLst>
-              <a:ext uri="{FF2B5EF4-FFF2-40B4-BE49-F238E27FC236}">
-                <a16:creationId xmlns:a16="http://schemas.microsoft.com/office/drawing/2014/main" id="{8E69348F-D28D-45FD-8FFE-69C7D5475F06}"/>
-              </a:ext>
-            </a:extLst>
-          </p:cNvPr>
-          <p:cNvSpPr/>
-          <p:nvPr/>
-        </p:nvSpPr>
-        <p:spPr>
-          <a:xfrm>
-            <a:off x="620785" y="113211"/>
-            <a:ext cx="10903417" cy="6559257"/>
-          </a:xfrm>
-          <a:prstGeom prst="rect">
-            <a:avLst/>
-          </a:prstGeom>
-          <a:noFill/>
-          <a:ln w="38100">
+          </p:spPr>
+          <p:style>
+            <a:lnRef idx="2">
+              <a:schemeClr val="accent1">
+                <a:shade val="50000"/>
+              </a:schemeClr>
+            </a:lnRef>
+            <a:fillRef idx="1">
+              <a:schemeClr val="accent1"/>
+            </a:fillRef>
+            <a:effectRef idx="0">
+              <a:schemeClr val="accent1"/>
+            </a:effectRef>
+            <a:fontRef idx="minor">
+              <a:schemeClr val="lt1"/>
+            </a:fontRef>
+          </p:style>
+          <p:txBody>
+            <a:bodyPr rtlCol="0" anchor="ctr"/>
+            <a:lstStyle/>
+            <a:p>
+              <a:pPr algn="ctr"/>
+              <a:endParaRPr lang="en-US"/>
+            </a:p>
+          </p:txBody>
+        </p:sp>
+        <p:sp>
+          <p:nvSpPr>
+            <p:cNvPr id="14" name="Rectangle 13">
+              <a:extLst>
+                <a:ext uri="{FF2B5EF4-FFF2-40B4-BE49-F238E27FC236}">
+                  <a16:creationId xmlns:a16="http://schemas.microsoft.com/office/drawing/2014/main" id="{DD028B59-F141-42F7-B662-6FDDEE25572C}"/>
+                </a:ext>
+              </a:extLst>
+            </p:cNvPr>
+            <p:cNvSpPr/>
+            <p:nvPr/>
+          </p:nvSpPr>
+          <p:spPr>
+            <a:xfrm>
+              <a:off x="1014189" y="5434149"/>
+              <a:ext cx="426720" cy="252548"/>
+            </a:xfrm>
+            <a:prstGeom prst="rect">
+              <a:avLst/>
+            </a:prstGeom>
             <a:solidFill>
-              <a:schemeClr val="tx1"/>
+              <a:srgbClr val="8C8C8C"/>
             </a:solidFill>
-          </a:ln>
-        </p:spPr>
-        <p:style>
-          <a:lnRef idx="2">
-            <a:schemeClr val="accent1">
-              <a:shade val="50000"/>
-            </a:schemeClr>
-          </a:lnRef>
-          <a:fillRef idx="1">
-            <a:schemeClr val="accent1"/>
-          </a:fillRef>
-          <a:effectRef idx="0">
-            <a:schemeClr val="accent1"/>
-          </a:effectRef>
-          <a:fontRef idx="minor">
-            <a:schemeClr val="lt1"/>
-          </a:fontRef>
-        </p:style>
-        <p:txBody>
-          <a:bodyPr rtlCol="0" anchor="ctr"/>
-          <a:lstStyle/>
-          <a:p>
-            <a:pPr algn="ctr"/>
-            <a:endParaRPr lang="en-US"/>
-          </a:p>
-        </p:txBody>
-      </p:sp>
+          </p:spPr>
+          <p:style>
+            <a:lnRef idx="2">
+              <a:schemeClr val="accent1">
+                <a:shade val="50000"/>
+              </a:schemeClr>
+            </a:lnRef>
+            <a:fillRef idx="1">
+              <a:schemeClr val="accent1"/>
+            </a:fillRef>
+            <a:effectRef idx="0">
+              <a:schemeClr val="accent1"/>
+            </a:effectRef>
+            <a:fontRef idx="minor">
+              <a:schemeClr val="lt1"/>
+            </a:fontRef>
+          </p:style>
+          <p:txBody>
+            <a:bodyPr rtlCol="0" anchor="ctr"/>
+            <a:lstStyle/>
+            <a:p>
+              <a:pPr algn="ctr"/>
+              <a:endParaRPr lang="en-US"/>
+            </a:p>
+          </p:txBody>
+        </p:sp>
+        <p:sp>
+          <p:nvSpPr>
+            <p:cNvPr id="15" name="Rectangle 14">
+              <a:extLst>
+                <a:ext uri="{FF2B5EF4-FFF2-40B4-BE49-F238E27FC236}">
+                  <a16:creationId xmlns:a16="http://schemas.microsoft.com/office/drawing/2014/main" id="{36FCFCDD-0F02-4375-8B56-3AFDB2793DB6}"/>
+                </a:ext>
+              </a:extLst>
+            </p:cNvPr>
+            <p:cNvSpPr/>
+            <p:nvPr/>
+          </p:nvSpPr>
+          <p:spPr>
+            <a:xfrm>
+              <a:off x="1014189" y="5826035"/>
+              <a:ext cx="426720" cy="252548"/>
+            </a:xfrm>
+            <a:prstGeom prst="rect">
+              <a:avLst/>
+            </a:prstGeom>
+            <a:solidFill>
+              <a:srgbClr val="D7D7D7"/>
+            </a:solidFill>
+          </p:spPr>
+          <p:style>
+            <a:lnRef idx="2">
+              <a:schemeClr val="accent1">
+                <a:shade val="50000"/>
+              </a:schemeClr>
+            </a:lnRef>
+            <a:fillRef idx="1">
+              <a:schemeClr val="accent1"/>
+            </a:fillRef>
+            <a:effectRef idx="0">
+              <a:schemeClr val="accent1"/>
+            </a:effectRef>
+            <a:fontRef idx="minor">
+              <a:schemeClr val="lt1"/>
+            </a:fontRef>
+          </p:style>
+          <p:txBody>
+            <a:bodyPr rtlCol="0" anchor="ctr"/>
+            <a:lstStyle/>
+            <a:p>
+              <a:pPr algn="ctr"/>
+              <a:endParaRPr lang="en-US"/>
+            </a:p>
+          </p:txBody>
+        </p:sp>
+        <p:sp>
+          <p:nvSpPr>
+            <p:cNvPr id="16" name="Rectangle 15">
+              <a:extLst>
+                <a:ext uri="{FF2B5EF4-FFF2-40B4-BE49-F238E27FC236}">
+                  <a16:creationId xmlns:a16="http://schemas.microsoft.com/office/drawing/2014/main" id="{377FAAD1-2B14-4AC7-AEF8-98786F323159}"/>
+                </a:ext>
+              </a:extLst>
+            </p:cNvPr>
+            <p:cNvSpPr/>
+            <p:nvPr/>
+          </p:nvSpPr>
+          <p:spPr>
+            <a:xfrm>
+              <a:off x="1014189" y="6200504"/>
+              <a:ext cx="426720" cy="252548"/>
+            </a:xfrm>
+            <a:prstGeom prst="rect">
+              <a:avLst/>
+            </a:prstGeom>
+            <a:solidFill>
+              <a:srgbClr val="FFFFFF"/>
+            </a:solidFill>
+          </p:spPr>
+          <p:style>
+            <a:lnRef idx="2">
+              <a:schemeClr val="accent1">
+                <a:shade val="50000"/>
+              </a:schemeClr>
+            </a:lnRef>
+            <a:fillRef idx="1">
+              <a:schemeClr val="accent1"/>
+            </a:fillRef>
+            <a:effectRef idx="0">
+              <a:schemeClr val="accent1"/>
+            </a:effectRef>
+            <a:fontRef idx="minor">
+              <a:schemeClr val="lt1"/>
+            </a:fontRef>
+          </p:style>
+          <p:txBody>
+            <a:bodyPr rtlCol="0" anchor="ctr"/>
+            <a:lstStyle/>
+            <a:p>
+              <a:pPr algn="ctr"/>
+              <a:endParaRPr lang="en-US"/>
+            </a:p>
+          </p:txBody>
+        </p:sp>
+        <p:sp>
+          <p:nvSpPr>
+            <p:cNvPr id="17" name="TextBox 16">
+              <a:extLst>
+                <a:ext uri="{FF2B5EF4-FFF2-40B4-BE49-F238E27FC236}">
+                  <a16:creationId xmlns:a16="http://schemas.microsoft.com/office/drawing/2014/main" id="{729C819A-8DB2-46F1-A08F-D7FCCCDF1A30}"/>
+                </a:ext>
+              </a:extLst>
+            </p:cNvPr>
+            <p:cNvSpPr txBox="1"/>
+            <p:nvPr/>
+          </p:nvSpPr>
+          <p:spPr>
+            <a:xfrm>
+              <a:off x="1554289" y="5014648"/>
+              <a:ext cx="1741714" cy="307777"/>
+            </a:xfrm>
+            <a:prstGeom prst="rect">
+              <a:avLst/>
+            </a:prstGeom>
+            <a:noFill/>
+          </p:spPr>
+          <p:txBody>
+            <a:bodyPr wrap="square" rtlCol="0">
+              <a:spAutoFit/>
+            </a:bodyPr>
+            <a:lstStyle/>
+            <a:p>
+              <a:r>
+                <a:rPr lang="en-US" sz="1400" dirty="0"/>
+                <a:t>Regulating Services</a:t>
+              </a:r>
+            </a:p>
+          </p:txBody>
+        </p:sp>
+        <p:sp>
+          <p:nvSpPr>
+            <p:cNvPr id="18" name="TextBox 17">
+              <a:extLst>
+                <a:ext uri="{FF2B5EF4-FFF2-40B4-BE49-F238E27FC236}">
+                  <a16:creationId xmlns:a16="http://schemas.microsoft.com/office/drawing/2014/main" id="{A94B020D-0233-42B1-9B65-32032FAB2382}"/>
+                </a:ext>
+              </a:extLst>
+            </p:cNvPr>
+            <p:cNvSpPr txBox="1"/>
+            <p:nvPr/>
+          </p:nvSpPr>
+          <p:spPr>
+            <a:xfrm>
+              <a:off x="1554289" y="5406534"/>
+              <a:ext cx="1741714" cy="307777"/>
+            </a:xfrm>
+            <a:prstGeom prst="rect">
+              <a:avLst/>
+            </a:prstGeom>
+            <a:noFill/>
+          </p:spPr>
+          <p:txBody>
+            <a:bodyPr wrap="square" rtlCol="0">
+              <a:spAutoFit/>
+            </a:bodyPr>
+            <a:lstStyle/>
+            <a:p>
+              <a:r>
+                <a:rPr lang="en-US" sz="1400" dirty="0"/>
+                <a:t>Supporting Services</a:t>
+              </a:r>
+            </a:p>
+          </p:txBody>
+        </p:sp>
+        <p:sp>
+          <p:nvSpPr>
+            <p:cNvPr id="19" name="TextBox 18">
+              <a:extLst>
+                <a:ext uri="{FF2B5EF4-FFF2-40B4-BE49-F238E27FC236}">
+                  <a16:creationId xmlns:a16="http://schemas.microsoft.com/office/drawing/2014/main" id="{EF2FD066-C346-4C05-A49C-6506C0533CD4}"/>
+                </a:ext>
+              </a:extLst>
+            </p:cNvPr>
+            <p:cNvSpPr txBox="1"/>
+            <p:nvPr/>
+          </p:nvSpPr>
+          <p:spPr>
+            <a:xfrm>
+              <a:off x="1554289" y="5826037"/>
+              <a:ext cx="1741714" cy="307777"/>
+            </a:xfrm>
+            <a:prstGeom prst="rect">
+              <a:avLst/>
+            </a:prstGeom>
+            <a:noFill/>
+          </p:spPr>
+          <p:txBody>
+            <a:bodyPr wrap="square" rtlCol="0">
+              <a:spAutoFit/>
+            </a:bodyPr>
+            <a:lstStyle/>
+            <a:p>
+              <a:r>
+                <a:rPr lang="en-US" sz="1400" dirty="0"/>
+                <a:t>Provisioning Services</a:t>
+              </a:r>
+            </a:p>
+          </p:txBody>
+        </p:sp>
+        <p:sp>
+          <p:nvSpPr>
+            <p:cNvPr id="20" name="TextBox 19">
+              <a:extLst>
+                <a:ext uri="{FF2B5EF4-FFF2-40B4-BE49-F238E27FC236}">
+                  <a16:creationId xmlns:a16="http://schemas.microsoft.com/office/drawing/2014/main" id="{A407AE30-4588-44C2-B293-6DF14F8396DA}"/>
+                </a:ext>
+              </a:extLst>
+            </p:cNvPr>
+            <p:cNvSpPr txBox="1"/>
+            <p:nvPr/>
+          </p:nvSpPr>
+          <p:spPr>
+            <a:xfrm>
+              <a:off x="1554289" y="6172889"/>
+              <a:ext cx="1741714" cy="307777"/>
+            </a:xfrm>
+            <a:prstGeom prst="rect">
+              <a:avLst/>
+            </a:prstGeom>
+            <a:noFill/>
+          </p:spPr>
+          <p:txBody>
+            <a:bodyPr wrap="square" rtlCol="0">
+              <a:spAutoFit/>
+            </a:bodyPr>
+            <a:lstStyle/>
+            <a:p>
+              <a:r>
+                <a:rPr lang="en-US" sz="1400" dirty="0"/>
+                <a:t>Cultural Services</a:t>
+              </a:r>
+            </a:p>
+          </p:txBody>
+        </p:sp>
+        <p:sp>
+          <p:nvSpPr>
+            <p:cNvPr id="21" name="TextBox 20">
+              <a:extLst>
+                <a:ext uri="{FF2B5EF4-FFF2-40B4-BE49-F238E27FC236}">
+                  <a16:creationId xmlns:a16="http://schemas.microsoft.com/office/drawing/2014/main" id="{203CA84C-637D-473E-AB0B-1D9E0879F48D}"/>
+                </a:ext>
+              </a:extLst>
+            </p:cNvPr>
+            <p:cNvSpPr txBox="1"/>
+            <p:nvPr/>
+          </p:nvSpPr>
+          <p:spPr>
+            <a:xfrm>
+              <a:off x="985473" y="4560528"/>
+              <a:ext cx="2189046" cy="369332"/>
+            </a:xfrm>
+            <a:prstGeom prst="rect">
+              <a:avLst/>
+            </a:prstGeom>
+            <a:noFill/>
+          </p:spPr>
+          <p:txBody>
+            <a:bodyPr wrap="square" rtlCol="0">
+              <a:spAutoFit/>
+            </a:bodyPr>
+            <a:lstStyle/>
+            <a:p>
+              <a:r>
+                <a:rPr lang="en-US" b="1" dirty="0"/>
+                <a:t>Legend</a:t>
+              </a:r>
+            </a:p>
+          </p:txBody>
+        </p:sp>
+        <p:sp>
+          <p:nvSpPr>
+            <p:cNvPr id="22" name="Rectangle 21">
+              <a:extLst>
+                <a:ext uri="{FF2B5EF4-FFF2-40B4-BE49-F238E27FC236}">
+                  <a16:creationId xmlns:a16="http://schemas.microsoft.com/office/drawing/2014/main" id="{F6D9FB7F-4C14-40CE-ADE5-0632774F7B87}"/>
+                </a:ext>
+              </a:extLst>
+            </p:cNvPr>
+            <p:cNvSpPr/>
+            <p:nvPr/>
+          </p:nvSpPr>
+          <p:spPr>
+            <a:xfrm>
+              <a:off x="620784" y="4445816"/>
+              <a:ext cx="2777839" cy="2225988"/>
+            </a:xfrm>
+            <a:prstGeom prst="rect">
+              <a:avLst/>
+            </a:prstGeom>
+            <a:noFill/>
+            <a:ln w="38100">
+              <a:solidFill>
+                <a:schemeClr val="tx1"/>
+              </a:solidFill>
+            </a:ln>
+          </p:spPr>
+          <p:style>
+            <a:lnRef idx="2">
+              <a:schemeClr val="accent1">
+                <a:shade val="50000"/>
+              </a:schemeClr>
+            </a:lnRef>
+            <a:fillRef idx="1">
+              <a:schemeClr val="accent1"/>
+            </a:fillRef>
+            <a:effectRef idx="0">
+              <a:schemeClr val="accent1"/>
+            </a:effectRef>
+            <a:fontRef idx="minor">
+              <a:schemeClr val="lt1"/>
+            </a:fontRef>
+          </p:style>
+          <p:txBody>
+            <a:bodyPr rtlCol="0" anchor="ctr"/>
+            <a:lstStyle/>
+            <a:p>
+              <a:pPr algn="ctr"/>
+              <a:endParaRPr lang="en-US"/>
+            </a:p>
+          </p:txBody>
+        </p:sp>
+        <p:sp>
+          <p:nvSpPr>
+            <p:cNvPr id="23" name="Rectangle 22">
+              <a:extLst>
+                <a:ext uri="{FF2B5EF4-FFF2-40B4-BE49-F238E27FC236}">
+                  <a16:creationId xmlns:a16="http://schemas.microsoft.com/office/drawing/2014/main" id="{8E69348F-D28D-45FD-8FFE-69C7D5475F06}"/>
+                </a:ext>
+              </a:extLst>
+            </p:cNvPr>
+            <p:cNvSpPr/>
+            <p:nvPr/>
+          </p:nvSpPr>
+          <p:spPr>
+            <a:xfrm>
+              <a:off x="620785" y="113211"/>
+              <a:ext cx="10903417" cy="6559257"/>
+            </a:xfrm>
+            <a:prstGeom prst="rect">
+              <a:avLst/>
+            </a:prstGeom>
+            <a:noFill/>
+            <a:ln w="38100">
+              <a:solidFill>
+                <a:schemeClr val="tx1"/>
+              </a:solidFill>
+            </a:ln>
+          </p:spPr>
+          <p:style>
+            <a:lnRef idx="2">
+              <a:schemeClr val="accent1">
+                <a:shade val="50000"/>
+              </a:schemeClr>
+            </a:lnRef>
+            <a:fillRef idx="1">
+              <a:schemeClr val="accent1"/>
+            </a:fillRef>
+            <a:effectRef idx="0">
+              <a:schemeClr val="accent1"/>
+            </a:effectRef>
+            <a:fontRef idx="minor">
+              <a:schemeClr val="lt1"/>
+            </a:fontRef>
+          </p:style>
+          <p:txBody>
+            <a:bodyPr rtlCol="0" anchor="ctr"/>
+            <a:lstStyle/>
+            <a:p>
+              <a:pPr algn="ctr"/>
+              <a:endParaRPr lang="en-US"/>
+            </a:p>
+          </p:txBody>
+        </p:sp>
+        <p:sp>
+          <p:nvSpPr>
+            <p:cNvPr id="24" name="TextBox 23">
+              <a:extLst>
+                <a:ext uri="{FF2B5EF4-FFF2-40B4-BE49-F238E27FC236}">
+                  <a16:creationId xmlns:a16="http://schemas.microsoft.com/office/drawing/2014/main" id="{ECF989DB-43F7-47F5-8299-D0514417AA14}"/>
+                </a:ext>
+              </a:extLst>
+            </p:cNvPr>
+            <p:cNvSpPr txBox="1"/>
+            <p:nvPr/>
+          </p:nvSpPr>
+          <p:spPr>
+            <a:xfrm>
+              <a:off x="620784" y="2200861"/>
+              <a:ext cx="2208575" cy="584775"/>
+            </a:xfrm>
+            <a:prstGeom prst="rect">
+              <a:avLst/>
+            </a:prstGeom>
+            <a:noFill/>
+          </p:spPr>
+          <p:txBody>
+            <a:bodyPr wrap="square" rtlCol="0">
+              <a:spAutoFit/>
+            </a:bodyPr>
+            <a:lstStyle/>
+            <a:p>
+              <a:pPr algn="r"/>
+              <a:r>
+                <a:rPr lang="en-US" sz="1600" dirty="0">
+                  <a:latin typeface="Arial" panose="020B0604020202020204" pitchFamily="34" charset="0"/>
+                  <a:cs typeface="Arial" panose="020B0604020202020204" pitchFamily="34" charset="0"/>
+                </a:rPr>
+                <a:t>Land Use/</a:t>
+              </a:r>
+            </a:p>
+            <a:p>
+              <a:pPr algn="r"/>
+              <a:r>
+                <a:rPr lang="en-US" sz="1600" dirty="0">
+                  <a:latin typeface="Arial" panose="020B0604020202020204" pitchFamily="34" charset="0"/>
+                  <a:cs typeface="Arial" panose="020B0604020202020204" pitchFamily="34" charset="0"/>
+                </a:rPr>
+                <a:t>Land Change</a:t>
+              </a:r>
+            </a:p>
+          </p:txBody>
+        </p:sp>
+      </p:grpSp>
     </p:spTree>
     <p:extLst>
       <p:ext uri="{BB962C8B-B14F-4D97-AF65-F5344CB8AC3E}">

</xml_diff>